<commit_message>
Uploading video submission files
Added video, ppt and transcript
</commit_message>
<xml_diff>
--- a/pictures/pdf/MaxGapm20n5s1v3.pptx
+++ b/pictures/pdf/MaxGapm20n5s1v3.pptx
@@ -302,7 +302,7 @@
           <a:p>
             <a:fld id="{62C34544-109E-374A-A6BF-6CE9DED3E76E}" type="datetimeFigureOut">
               <a:rPr lang="en-US" smtClean="0"/>
-              <a:t>2/27/2017</a:t>
+              <a:t>3/5/2017</a:t>
             </a:fld>
             <a:endParaRPr lang="en-US"/>
           </a:p>
@@ -470,7 +470,7 @@
           <a:p>
             <a:fld id="{62C34544-109E-374A-A6BF-6CE9DED3E76E}" type="datetimeFigureOut">
               <a:rPr lang="en-US" smtClean="0"/>
-              <a:t>2/27/2017</a:t>
+              <a:t>3/5/2017</a:t>
             </a:fld>
             <a:endParaRPr lang="en-US"/>
           </a:p>
@@ -648,7 +648,7 @@
           <a:p>
             <a:fld id="{62C34544-109E-374A-A6BF-6CE9DED3E76E}" type="datetimeFigureOut">
               <a:rPr lang="en-US" smtClean="0"/>
-              <a:t>2/27/2017</a:t>
+              <a:t>3/5/2017</a:t>
             </a:fld>
             <a:endParaRPr lang="en-US"/>
           </a:p>
@@ -816,7 +816,7 @@
           <a:p>
             <a:fld id="{62C34544-109E-374A-A6BF-6CE9DED3E76E}" type="datetimeFigureOut">
               <a:rPr lang="en-US" smtClean="0"/>
-              <a:t>2/27/2017</a:t>
+              <a:t>3/5/2017</a:t>
             </a:fld>
             <a:endParaRPr lang="en-US"/>
           </a:p>
@@ -1061,7 +1061,7 @@
           <a:p>
             <a:fld id="{62C34544-109E-374A-A6BF-6CE9DED3E76E}" type="datetimeFigureOut">
               <a:rPr lang="en-US" smtClean="0"/>
-              <a:t>2/27/2017</a:t>
+              <a:t>3/5/2017</a:t>
             </a:fld>
             <a:endParaRPr lang="en-US"/>
           </a:p>
@@ -1346,7 +1346,7 @@
           <a:p>
             <a:fld id="{62C34544-109E-374A-A6BF-6CE9DED3E76E}" type="datetimeFigureOut">
               <a:rPr lang="en-US" smtClean="0"/>
-              <a:t>2/27/2017</a:t>
+              <a:t>3/5/2017</a:t>
             </a:fld>
             <a:endParaRPr lang="en-US"/>
           </a:p>
@@ -1765,7 +1765,7 @@
           <a:p>
             <a:fld id="{62C34544-109E-374A-A6BF-6CE9DED3E76E}" type="datetimeFigureOut">
               <a:rPr lang="en-US" smtClean="0"/>
-              <a:t>2/27/2017</a:t>
+              <a:t>3/5/2017</a:t>
             </a:fld>
             <a:endParaRPr lang="en-US"/>
           </a:p>
@@ -1882,7 +1882,7 @@
           <a:p>
             <a:fld id="{62C34544-109E-374A-A6BF-6CE9DED3E76E}" type="datetimeFigureOut">
               <a:rPr lang="en-US" smtClean="0"/>
-              <a:t>2/27/2017</a:t>
+              <a:t>3/5/2017</a:t>
             </a:fld>
             <a:endParaRPr lang="en-US"/>
           </a:p>
@@ -1977,7 +1977,7 @@
           <a:p>
             <a:fld id="{62C34544-109E-374A-A6BF-6CE9DED3E76E}" type="datetimeFigureOut">
               <a:rPr lang="en-US" smtClean="0"/>
-              <a:t>2/27/2017</a:t>
+              <a:t>3/5/2017</a:t>
             </a:fld>
             <a:endParaRPr lang="en-US"/>
           </a:p>
@@ -2252,7 +2252,7 @@
           <a:p>
             <a:fld id="{62C34544-109E-374A-A6BF-6CE9DED3E76E}" type="datetimeFigureOut">
               <a:rPr lang="en-US" smtClean="0"/>
-              <a:t>2/27/2017</a:t>
+              <a:t>3/5/2017</a:t>
             </a:fld>
             <a:endParaRPr lang="en-US"/>
           </a:p>
@@ -2504,7 +2504,7 @@
           <a:p>
             <a:fld id="{62C34544-109E-374A-A6BF-6CE9DED3E76E}" type="datetimeFigureOut">
               <a:rPr lang="en-US" smtClean="0"/>
-              <a:t>2/27/2017</a:t>
+              <a:t>3/5/2017</a:t>
             </a:fld>
             <a:endParaRPr lang="en-US"/>
           </a:p>
@@ -2715,7 +2715,7 @@
           <a:p>
             <a:fld id="{62C34544-109E-374A-A6BF-6CE9DED3E76E}" type="datetimeFigureOut">
               <a:rPr lang="en-US" smtClean="0"/>
-              <a:t>2/27/2017</a:t>
+              <a:t>3/5/2017</a:t>
             </a:fld>
             <a:endParaRPr lang="en-US"/>
           </a:p>
@@ -3482,7 +3482,7 @@
           <a:graphicData uri="http://schemas.openxmlformats.org/presentationml/2006/ole">
             <mc:AlternateContent xmlns:mc="http://schemas.openxmlformats.org/markup-compatibility/2006">
               <mc:Choice xmlns:v="urn:schemas-microsoft-com:vml" Requires="v">
-                <p:oleObj spid="_x0000_s1057" name="Document" r:id="rId3" imgW="5943600" imgH="2108200" progId="Word.Document.12">
+                <p:oleObj spid="_x0000_s1073" name="Document" r:id="rId3" imgW="5943600" imgH="2108200" progId="Word.Document.12">
                   <p:embed/>
                 </p:oleObj>
               </mc:Choice>
@@ -3539,7 +3539,7 @@
           <a:graphicData uri="http://schemas.openxmlformats.org/presentationml/2006/ole">
             <mc:AlternateContent xmlns:mc="http://schemas.openxmlformats.org/markup-compatibility/2006">
               <mc:Choice xmlns:v="urn:schemas-microsoft-com:vml" Requires="v">
-                <p:oleObj spid="_x0000_s1058" name="Document" r:id="rId5" imgW="5943600" imgH="2108200" progId="Word.Document.12">
+                <p:oleObj spid="_x0000_s1074" name="Document" r:id="rId5" imgW="5943600" imgH="2108200" progId="Word.Document.12">
                   <p:embed/>
                 </p:oleObj>
               </mc:Choice>
@@ -3596,7 +3596,7 @@
           <a:graphicData uri="http://schemas.openxmlformats.org/presentationml/2006/ole">
             <mc:AlternateContent xmlns:mc="http://schemas.openxmlformats.org/markup-compatibility/2006">
               <mc:Choice xmlns:v="urn:schemas-microsoft-com:vml" Requires="v">
-                <p:oleObj spid="_x0000_s1059" name="Document" r:id="rId7" imgW="5943600" imgH="2108200" progId="Word.Document.12">
+                <p:oleObj spid="_x0000_s1075" name="Document" r:id="rId7" imgW="5943600" imgH="2108200" progId="Word.Document.12">
                   <p:embed/>
                 </p:oleObj>
               </mc:Choice>
@@ -3653,7 +3653,7 @@
           <a:graphicData uri="http://schemas.openxmlformats.org/presentationml/2006/ole">
             <mc:AlternateContent xmlns:mc="http://schemas.openxmlformats.org/markup-compatibility/2006">
               <mc:Choice xmlns:v="urn:schemas-microsoft-com:vml" Requires="v">
-                <p:oleObj spid="_x0000_s1060" name="Document" r:id="rId9" imgW="5943600" imgH="2108200" progId="Word.Document.12">
+                <p:oleObj spid="_x0000_s1076" name="Document" r:id="rId9" imgW="5943600" imgH="2108200" progId="Word.Document.12">
                   <p:embed/>
                 </p:oleObj>
               </mc:Choice>
@@ -3757,7 +3757,7 @@
           <a:graphicData uri="http://schemas.openxmlformats.org/presentationml/2006/ole">
             <mc:AlternateContent xmlns:mc="http://schemas.openxmlformats.org/markup-compatibility/2006">
               <mc:Choice xmlns:v="urn:schemas-microsoft-com:vml" Requires="v">
-                <p:oleObj spid="_x0000_s1061" name="Document" r:id="rId11" imgW="5943600" imgH="2108200" progId="Word.Document.12">
+                <p:oleObj spid="_x0000_s1077" name="Document" r:id="rId11" imgW="5943600" imgH="2108200" progId="Word.Document.12">
                   <p:embed/>
                 </p:oleObj>
               </mc:Choice>
@@ -3972,7 +3972,7 @@
           <a:graphicData uri="http://schemas.openxmlformats.org/presentationml/2006/ole">
             <mc:AlternateContent xmlns:mc="http://schemas.openxmlformats.org/markup-compatibility/2006">
               <mc:Choice xmlns:v="urn:schemas-microsoft-com:vml" Requires="v">
-                <p:oleObj spid="_x0000_s1062" name="Document" r:id="rId13" imgW="5943600" imgH="2552700" progId="Word.Document.12">
+                <p:oleObj spid="_x0000_s1078" name="Document" r:id="rId13" imgW="5943600" imgH="2552700" progId="Word.Document.12">
                   <p:embed/>
                 </p:oleObj>
               </mc:Choice>
@@ -4106,20 +4106,20 @@
           <p:nvPr>
             <p:extLst>
               <p:ext uri="{D42A27DB-BD31-4B8C-83A1-F6EECF244321}">
-                <p14:modId xmlns:p14="http://schemas.microsoft.com/office/powerpoint/2010/main" val="777206844"/>
+                <p14:modId xmlns:p14="http://schemas.microsoft.com/office/powerpoint/2010/main" val="2185891284"/>
               </p:ext>
             </p:extLst>
           </p:nvPr>
         </p:nvGraphicFramePr>
         <p:xfrm>
-          <a:off x="7353058" y="-757276"/>
-          <a:ext cx="1082675" cy="387350"/>
+          <a:off x="7873134" y="330362"/>
+          <a:ext cx="886705" cy="387350"/>
         </p:xfrm>
         <a:graphic>
           <a:graphicData uri="http://schemas.openxmlformats.org/presentationml/2006/ole">
             <mc:AlternateContent xmlns:mc="http://schemas.openxmlformats.org/markup-compatibility/2006">
               <mc:Choice xmlns:v="urn:schemas-microsoft-com:vml" Requires="v">
-                <p:oleObj spid="_x0000_s1063" name="Document" r:id="rId15" imgW="4117179" imgH="2113760" progId="Word.Document.12">
+                <p:oleObj spid="_x0000_s1079" name="Document" r:id="rId15" imgW="4117179" imgH="2113760" progId="Word.Document.12">
                   <p:embed/>
                 </p:oleObj>
               </mc:Choice>
@@ -4140,8 +4140,8 @@
                     </p:blipFill>
                     <p:spPr>
                       <a:xfrm>
-                        <a:off x="7353058" y="-757276"/>
-                        <a:ext cx="1082675" cy="387350"/>
+                        <a:off x="7873134" y="330362"/>
+                        <a:ext cx="886705" cy="387350"/>
                       </a:xfrm>
                       <a:prstGeom prst="rect">
                         <a:avLst/>
@@ -4176,7 +4176,7 @@
           <a:graphicData uri="http://schemas.openxmlformats.org/presentationml/2006/ole">
             <mc:AlternateContent xmlns:mc="http://schemas.openxmlformats.org/markup-compatibility/2006">
               <mc:Choice xmlns:v="urn:schemas-microsoft-com:vml" Requires="v">
-                <p:oleObj spid="_x0000_s1064" name="Document" r:id="rId17" imgW="5943600" imgH="2108200" progId="Word.Document.12">
+                <p:oleObj spid="_x0000_s1080" name="Document" r:id="rId17" imgW="5943600" imgH="2108200" progId="Word.Document.12">
                   <p:embed/>
                 </p:oleObj>
               </mc:Choice>

</xml_diff>

<commit_message>
\emph{region~fill} better kerning than $region~fill$
</commit_message>
<xml_diff>
--- a/pictures/pdf/MaxGapm20n5s1v3.pptx
+++ b/pictures/pdf/MaxGapm20n5s1v3.pptx
@@ -106,7 +106,7 @@
   </p:defaultTextStyle>
   <p:extLst>
     <p:ext uri="{EFAFB233-063F-42B5-8137-9DF3F51BA10A}">
-      <p15:sldGuideLst xmlns:p15="http://schemas.microsoft.com/office/powerpoint/2012/main">
+      <p15:sldGuideLst xmlns:p15="http://schemas.microsoft.com/office/powerpoint/2012/main" xmlns="">
         <p15:guide id="1" orient="horz" pos="375">
           <p15:clr>
             <a:srgbClr val="A4A3A4"/>
@@ -302,7 +302,7 @@
           <a:p>
             <a:fld id="{62C34544-109E-374A-A6BF-6CE9DED3E76E}" type="datetimeFigureOut">
               <a:rPr lang="en-US" smtClean="0"/>
-              <a:t>3/5/2017</a:t>
+              <a:t>7/22/17</a:t>
             </a:fld>
             <a:endParaRPr lang="en-US"/>
           </a:p>
@@ -470,7 +470,7 @@
           <a:p>
             <a:fld id="{62C34544-109E-374A-A6BF-6CE9DED3E76E}" type="datetimeFigureOut">
               <a:rPr lang="en-US" smtClean="0"/>
-              <a:t>3/5/2017</a:t>
+              <a:t>7/22/17</a:t>
             </a:fld>
             <a:endParaRPr lang="en-US"/>
           </a:p>
@@ -648,7 +648,7 @@
           <a:p>
             <a:fld id="{62C34544-109E-374A-A6BF-6CE9DED3E76E}" type="datetimeFigureOut">
               <a:rPr lang="en-US" smtClean="0"/>
-              <a:t>3/5/2017</a:t>
+              <a:t>7/22/17</a:t>
             </a:fld>
             <a:endParaRPr lang="en-US"/>
           </a:p>
@@ -816,7 +816,7 @@
           <a:p>
             <a:fld id="{62C34544-109E-374A-A6BF-6CE9DED3E76E}" type="datetimeFigureOut">
               <a:rPr lang="en-US" smtClean="0"/>
-              <a:t>3/5/2017</a:t>
+              <a:t>7/22/17</a:t>
             </a:fld>
             <a:endParaRPr lang="en-US"/>
           </a:p>
@@ -1061,7 +1061,7 @@
           <a:p>
             <a:fld id="{62C34544-109E-374A-A6BF-6CE9DED3E76E}" type="datetimeFigureOut">
               <a:rPr lang="en-US" smtClean="0"/>
-              <a:t>3/5/2017</a:t>
+              <a:t>7/22/17</a:t>
             </a:fld>
             <a:endParaRPr lang="en-US"/>
           </a:p>
@@ -1346,7 +1346,7 @@
           <a:p>
             <a:fld id="{62C34544-109E-374A-A6BF-6CE9DED3E76E}" type="datetimeFigureOut">
               <a:rPr lang="en-US" smtClean="0"/>
-              <a:t>3/5/2017</a:t>
+              <a:t>7/22/17</a:t>
             </a:fld>
             <a:endParaRPr lang="en-US"/>
           </a:p>
@@ -1765,7 +1765,7 @@
           <a:p>
             <a:fld id="{62C34544-109E-374A-A6BF-6CE9DED3E76E}" type="datetimeFigureOut">
               <a:rPr lang="en-US" smtClean="0"/>
-              <a:t>3/5/2017</a:t>
+              <a:t>7/22/17</a:t>
             </a:fld>
             <a:endParaRPr lang="en-US"/>
           </a:p>
@@ -1882,7 +1882,7 @@
           <a:p>
             <a:fld id="{62C34544-109E-374A-A6BF-6CE9DED3E76E}" type="datetimeFigureOut">
               <a:rPr lang="en-US" smtClean="0"/>
-              <a:t>3/5/2017</a:t>
+              <a:t>7/22/17</a:t>
             </a:fld>
             <a:endParaRPr lang="en-US"/>
           </a:p>
@@ -1977,7 +1977,7 @@
           <a:p>
             <a:fld id="{62C34544-109E-374A-A6BF-6CE9DED3E76E}" type="datetimeFigureOut">
               <a:rPr lang="en-US" smtClean="0"/>
-              <a:t>3/5/2017</a:t>
+              <a:t>7/22/17</a:t>
             </a:fld>
             <a:endParaRPr lang="en-US"/>
           </a:p>
@@ -2252,7 +2252,7 @@
           <a:p>
             <a:fld id="{62C34544-109E-374A-A6BF-6CE9DED3E76E}" type="datetimeFigureOut">
               <a:rPr lang="en-US" smtClean="0"/>
-              <a:t>3/5/2017</a:t>
+              <a:t>7/22/17</a:t>
             </a:fld>
             <a:endParaRPr lang="en-US"/>
           </a:p>
@@ -2504,7 +2504,7 @@
           <a:p>
             <a:fld id="{62C34544-109E-374A-A6BF-6CE9DED3E76E}" type="datetimeFigureOut">
               <a:rPr lang="en-US" smtClean="0"/>
-              <a:t>3/5/2017</a:t>
+              <a:t>7/22/17</a:t>
             </a:fld>
             <a:endParaRPr lang="en-US"/>
           </a:p>
@@ -2715,7 +2715,7 @@
           <a:p>
             <a:fld id="{62C34544-109E-374A-A6BF-6CE9DED3E76E}" type="datetimeFigureOut">
               <a:rPr lang="en-US" smtClean="0"/>
-              <a:t>3/5/2017</a:t>
+              <a:t>7/22/17</a:t>
             </a:fld>
             <a:endParaRPr lang="en-US"/>
           </a:p>
@@ -3482,12 +3482,12 @@
           <a:graphicData uri="http://schemas.openxmlformats.org/presentationml/2006/ole">
             <mc:AlternateContent xmlns:mc="http://schemas.openxmlformats.org/markup-compatibility/2006">
               <mc:Choice xmlns:v="urn:schemas-microsoft-com:vml" Requires="v">
-                <p:oleObj spid="_x0000_s1073" name="Document" r:id="rId3" imgW="5943600" imgH="2108200" progId="Word.Document.12">
+                <p:oleObj spid="_x0000_s1082" name="Document" r:id="rId4" imgW="5943600" imgH="2108200" progId="Word.Document.12">
                   <p:embed/>
                 </p:oleObj>
               </mc:Choice>
               <mc:Fallback>
-                <p:oleObj name="Document" r:id="rId3" imgW="5943600" imgH="2108200" progId="Word.Document.12">
+                <p:oleObj name="Document" r:id="rId4" imgW="5943600" imgH="2108200" progId="Word.Document.12">
                   <p:embed/>
                   <p:pic>
                     <p:nvPicPr>
@@ -3496,7 +3496,7 @@
                       <p:nvPr/>
                     </p:nvPicPr>
                     <p:blipFill>
-                      <a:blip r:embed="rId4"/>
+                      <a:blip r:embed="rId5"/>
                       <a:stretch>
                         <a:fillRect/>
                       </a:stretch>
@@ -3539,12 +3539,12 @@
           <a:graphicData uri="http://schemas.openxmlformats.org/presentationml/2006/ole">
             <mc:AlternateContent xmlns:mc="http://schemas.openxmlformats.org/markup-compatibility/2006">
               <mc:Choice xmlns:v="urn:schemas-microsoft-com:vml" Requires="v">
-                <p:oleObj spid="_x0000_s1074" name="Document" r:id="rId5" imgW="5943600" imgH="2108200" progId="Word.Document.12">
+                <p:oleObj spid="_x0000_s1083" name="Document" r:id="rId7" imgW="5943600" imgH="2108200" progId="Word.Document.12">
                   <p:embed/>
                 </p:oleObj>
               </mc:Choice>
               <mc:Fallback>
-                <p:oleObj name="Document" r:id="rId5" imgW="5943600" imgH="2108200" progId="Word.Document.12">
+                <p:oleObj name="Document" r:id="rId7" imgW="5943600" imgH="2108200" progId="Word.Document.12">
                   <p:embed/>
                   <p:pic>
                     <p:nvPicPr>
@@ -3553,7 +3553,7 @@
                       <p:nvPr/>
                     </p:nvPicPr>
                     <p:blipFill>
-                      <a:blip r:embed="rId6"/>
+                      <a:blip r:embed="rId8"/>
                       <a:stretch>
                         <a:fillRect/>
                       </a:stretch>
@@ -3596,12 +3596,12 @@
           <a:graphicData uri="http://schemas.openxmlformats.org/presentationml/2006/ole">
             <mc:AlternateContent xmlns:mc="http://schemas.openxmlformats.org/markup-compatibility/2006">
               <mc:Choice xmlns:v="urn:schemas-microsoft-com:vml" Requires="v">
-                <p:oleObj spid="_x0000_s1075" name="Document" r:id="rId7" imgW="5943600" imgH="2108200" progId="Word.Document.12">
+                <p:oleObj spid="_x0000_s1084" name="Document" r:id="rId10" imgW="5943600" imgH="2108200" progId="Word.Document.12">
                   <p:embed/>
                 </p:oleObj>
               </mc:Choice>
               <mc:Fallback>
-                <p:oleObj name="Document" r:id="rId7" imgW="5943600" imgH="2108200" progId="Word.Document.12">
+                <p:oleObj name="Document" r:id="rId10" imgW="5943600" imgH="2108200" progId="Word.Document.12">
                   <p:embed/>
                   <p:pic>
                     <p:nvPicPr>
@@ -3610,7 +3610,7 @@
                       <p:nvPr/>
                     </p:nvPicPr>
                     <p:blipFill>
-                      <a:blip r:embed="rId8"/>
+                      <a:blip r:embed="rId11"/>
                       <a:stretch>
                         <a:fillRect/>
                       </a:stretch>
@@ -3653,12 +3653,12 @@
           <a:graphicData uri="http://schemas.openxmlformats.org/presentationml/2006/ole">
             <mc:AlternateContent xmlns:mc="http://schemas.openxmlformats.org/markup-compatibility/2006">
               <mc:Choice xmlns:v="urn:schemas-microsoft-com:vml" Requires="v">
-                <p:oleObj spid="_x0000_s1076" name="Document" r:id="rId9" imgW="5943600" imgH="2108200" progId="Word.Document.12">
+                <p:oleObj spid="_x0000_s1085" name="Document" r:id="rId13" imgW="5943600" imgH="2108200" progId="Word.Document.12">
                   <p:embed/>
                 </p:oleObj>
               </mc:Choice>
               <mc:Fallback>
-                <p:oleObj name="Document" r:id="rId9" imgW="5943600" imgH="2108200" progId="Word.Document.12">
+                <p:oleObj name="Document" r:id="rId13" imgW="5943600" imgH="2108200" progId="Word.Document.12">
                   <p:embed/>
                   <p:pic>
                     <p:nvPicPr>
@@ -3667,7 +3667,7 @@
                       <p:nvPr/>
                     </p:nvPicPr>
                     <p:blipFill>
-                      <a:blip r:embed="rId10"/>
+                      <a:blip r:embed="rId14"/>
                       <a:stretch>
                         <a:fillRect/>
                       </a:stretch>
@@ -3757,12 +3757,12 @@
           <a:graphicData uri="http://schemas.openxmlformats.org/presentationml/2006/ole">
             <mc:AlternateContent xmlns:mc="http://schemas.openxmlformats.org/markup-compatibility/2006">
               <mc:Choice xmlns:v="urn:schemas-microsoft-com:vml" Requires="v">
-                <p:oleObj spid="_x0000_s1077" name="Document" r:id="rId11" imgW="5943600" imgH="2108200" progId="Word.Document.12">
+                <p:oleObj spid="_x0000_s1086" name="Document" r:id="rId15" imgW="5943600" imgH="2108200" progId="Word.Document.12">
                   <p:embed/>
                 </p:oleObj>
               </mc:Choice>
               <mc:Fallback>
-                <p:oleObj name="Document" r:id="rId11" imgW="5943600" imgH="2108200" progId="Word.Document.12">
+                <p:oleObj name="Document" r:id="rId15" imgW="5943600" imgH="2108200" progId="Word.Document.12">
                   <p:embed/>
                   <p:pic>
                     <p:nvPicPr>
@@ -3771,7 +3771,7 @@
                       <p:nvPr/>
                     </p:nvPicPr>
                     <p:blipFill>
-                      <a:blip r:embed="rId12"/>
+                      <a:blip r:embed="rId16"/>
                       <a:stretch>
                         <a:fillRect/>
                       </a:stretch>
@@ -3795,15 +3795,13 @@
       <p:cxnSp>
         <p:nvCxnSpPr>
           <p:cNvPr id="122" name="Straight Arrow Connector 121"/>
-          <p:cNvCxnSpPr>
-            <a:stCxn id="109" idx="1"/>
-          </p:cNvCxnSpPr>
+          <p:cNvCxnSpPr/>
           <p:nvPr/>
         </p:nvCxnSpPr>
         <p:spPr>
           <a:xfrm flipV="1">
-            <a:off x="515698" y="561750"/>
-            <a:ext cx="1655616" cy="11544"/>
+            <a:off x="515698" y="234145"/>
+            <a:ext cx="2036616" cy="11544"/>
           </a:xfrm>
           <a:prstGeom prst="straightConnector1">
             <a:avLst/>
@@ -3876,8 +3874,8 @@
         </p:nvCxnSpPr>
         <p:spPr>
           <a:xfrm>
-            <a:off x="8084896" y="561750"/>
-            <a:ext cx="438727" cy="0"/>
+            <a:off x="515698" y="118295"/>
+            <a:ext cx="7536102" cy="0"/>
           </a:xfrm>
           <a:prstGeom prst="straightConnector1">
             <a:avLst/>
@@ -3950,63 +3948,6 @@
           </a:p>
         </p:txBody>
       </p:sp>
-      <p:graphicFrame>
-        <p:nvGraphicFramePr>
-          <p:cNvPr id="126" name="Object 125"/>
-          <p:cNvGraphicFramePr>
-            <a:graphicFrameLocks noChangeAspect="1"/>
-          </p:cNvGraphicFramePr>
-          <p:nvPr>
-            <p:extLst>
-              <p:ext uri="{D42A27DB-BD31-4B8C-83A1-F6EECF244321}">
-                <p14:modId xmlns:p14="http://schemas.microsoft.com/office/powerpoint/2010/main" val="3055981097"/>
-              </p:ext>
-            </p:extLst>
-          </p:nvPr>
-        </p:nvGraphicFramePr>
-        <p:xfrm>
-          <a:off x="745597" y="289881"/>
-          <a:ext cx="1082675" cy="468312"/>
-        </p:xfrm>
-        <a:graphic>
-          <a:graphicData uri="http://schemas.openxmlformats.org/presentationml/2006/ole">
-            <mc:AlternateContent xmlns:mc="http://schemas.openxmlformats.org/markup-compatibility/2006">
-              <mc:Choice xmlns:v="urn:schemas-microsoft-com:vml" Requires="v">
-                <p:oleObj spid="_x0000_s1078" name="Document" r:id="rId13" imgW="5943600" imgH="2552700" progId="Word.Document.12">
-                  <p:embed/>
-                </p:oleObj>
-              </mc:Choice>
-              <mc:Fallback>
-                <p:oleObj name="Document" r:id="rId13" imgW="5943600" imgH="2552700" progId="Word.Document.12">
-                  <p:embed/>
-                  <p:pic>
-                    <p:nvPicPr>
-                      <p:cNvPr id="0" name=""/>
-                      <p:cNvPicPr/>
-                      <p:nvPr/>
-                    </p:nvPicPr>
-                    <p:blipFill>
-                      <a:blip r:embed="rId14"/>
-                      <a:stretch>
-                        <a:fillRect/>
-                      </a:stretch>
-                    </p:blipFill>
-                    <p:spPr>
-                      <a:xfrm>
-                        <a:off x="745597" y="289881"/>
-                        <a:ext cx="1082675" cy="468312"/>
-                      </a:xfrm>
-                      <a:prstGeom prst="rect">
-                        <a:avLst/>
-                      </a:prstGeom>
-                    </p:spPr>
-                  </p:pic>
-                </p:oleObj>
-              </mc:Fallback>
-            </mc:AlternateContent>
-          </a:graphicData>
-        </a:graphic>
-      </p:graphicFrame>
       <p:sp>
         <p:nvSpPr>
           <p:cNvPr id="127" name="Rectangle 126"/>
@@ -4060,14 +4001,14 @@
         </p:nvSpPr>
         <p:spPr>
           <a:xfrm>
-            <a:off x="8237570" y="404233"/>
+            <a:off x="6550360" y="18660"/>
             <a:ext cx="157834" cy="315034"/>
           </a:xfrm>
           <a:prstGeom prst="rect">
             <a:avLst/>
           </a:prstGeom>
           <a:solidFill>
-            <a:schemeClr val="bg1"/>
+            <a:schemeClr val="tx1"/>
           </a:solidFill>
           <a:ln>
             <a:noFill/>
@@ -4106,25 +4047,25 @@
           <p:nvPr>
             <p:extLst>
               <p:ext uri="{D42A27DB-BD31-4B8C-83A1-F6EECF244321}">
-                <p14:modId xmlns:p14="http://schemas.microsoft.com/office/powerpoint/2010/main" val="2185891284"/>
+                <p14:modId xmlns:p14="http://schemas.microsoft.com/office/powerpoint/2010/main" val="3737397394"/>
               </p:ext>
             </p:extLst>
           </p:nvPr>
         </p:nvGraphicFramePr>
         <p:xfrm>
-          <a:off x="7873134" y="330362"/>
-          <a:ext cx="886705" cy="387350"/>
+          <a:off x="6184777" y="-52069"/>
+          <a:ext cx="889000" cy="385763"/>
         </p:xfrm>
         <a:graphic>
           <a:graphicData uri="http://schemas.openxmlformats.org/presentationml/2006/ole">
             <mc:AlternateContent xmlns:mc="http://schemas.openxmlformats.org/markup-compatibility/2006">
               <mc:Choice xmlns:v="urn:schemas-microsoft-com:vml" Requires="v">
-                <p:oleObj spid="_x0000_s1079" name="Document" r:id="rId15" imgW="4117179" imgH="2113760" progId="Word.Document.12">
+                <p:oleObj spid="_x0000_s1087" name="Document" r:id="rId17" imgW="4127500" imgH="2108200" progId="Word.Document.12">
                   <p:embed/>
                 </p:oleObj>
               </mc:Choice>
               <mc:Fallback>
-                <p:oleObj name="Document" r:id="rId15" imgW="4117179" imgH="2113760" progId="Word.Document.12">
+                <p:oleObj name="Document" r:id="rId17" imgW="4127500" imgH="2108200" progId="Word.Document.12">
                   <p:embed/>
                   <p:pic>
                     <p:nvPicPr>
@@ -4133,15 +4074,15 @@
                       <p:nvPr/>
                     </p:nvPicPr>
                     <p:blipFill>
-                      <a:blip r:embed="rId16"/>
+                      <a:blip r:embed="rId18"/>
                       <a:stretch>
                         <a:fillRect/>
                       </a:stretch>
                     </p:blipFill>
                     <p:spPr>
                       <a:xfrm>
-                        <a:off x="7873134" y="330362"/>
-                        <a:ext cx="886705" cy="387350"/>
+                        <a:off x="6184777" y="-52069"/>
+                        <a:ext cx="889000" cy="385763"/>
                       </a:xfrm>
                       <a:prstGeom prst="rect">
                         <a:avLst/>
@@ -4176,12 +4117,12 @@
           <a:graphicData uri="http://schemas.openxmlformats.org/presentationml/2006/ole">
             <mc:AlternateContent xmlns:mc="http://schemas.openxmlformats.org/markup-compatibility/2006">
               <mc:Choice xmlns:v="urn:schemas-microsoft-com:vml" Requires="v">
-                <p:oleObj spid="_x0000_s1080" name="Document" r:id="rId17" imgW="5943600" imgH="2108200" progId="Word.Document.12">
+                <p:oleObj spid="_x0000_s1088" name="Document" r:id="rId20" imgW="5943600" imgH="2108200" progId="Word.Document.12">
                   <p:embed/>
                 </p:oleObj>
               </mc:Choice>
               <mc:Fallback>
-                <p:oleObj name="Document" r:id="rId17" imgW="5943600" imgH="2108200" progId="Word.Document.12">
+                <p:oleObj name="Document" r:id="rId20" imgW="5943600" imgH="2108200" progId="Word.Document.12">
                   <p:embed/>
                   <p:pic>
                     <p:nvPicPr>
@@ -4190,7 +4131,7 @@
                       <p:nvPr/>
                     </p:nvPicPr>
                     <p:blipFill>
-                      <a:blip r:embed="rId18"/>
+                      <a:blip r:embed="rId21"/>
                       <a:stretch>
                         <a:fillRect/>
                       </a:stretch>
@@ -4199,6 +4140,108 @@
                       <a:xfrm>
                         <a:off x="3739789" y="317628"/>
                         <a:ext cx="1082364" cy="384305"/>
+                      </a:xfrm>
+                      <a:prstGeom prst="rect">
+                        <a:avLst/>
+                      </a:prstGeom>
+                    </p:spPr>
+                  </p:pic>
+                </p:oleObj>
+              </mc:Fallback>
+            </mc:AlternateContent>
+          </a:graphicData>
+        </a:graphic>
+      </p:graphicFrame>
+      <p:sp>
+        <p:nvSpPr>
+          <p:cNvPr id="26" name="Rectangle 25"/>
+          <p:cNvSpPr/>
+          <p:nvPr/>
+        </p:nvSpPr>
+        <p:spPr>
+          <a:xfrm>
+            <a:off x="1355583" y="40959"/>
+            <a:ext cx="157834" cy="315034"/>
+          </a:xfrm>
+          <a:prstGeom prst="rect">
+            <a:avLst/>
+          </a:prstGeom>
+          <a:solidFill>
+            <a:schemeClr val="tx1"/>
+          </a:solidFill>
+          <a:ln>
+            <a:noFill/>
+          </a:ln>
+          <a:effectLst/>
+        </p:spPr>
+        <p:style>
+          <a:lnRef idx="1">
+            <a:schemeClr val="accent1"/>
+          </a:lnRef>
+          <a:fillRef idx="3">
+            <a:schemeClr val="accent1"/>
+          </a:fillRef>
+          <a:effectRef idx="2">
+            <a:schemeClr val="accent1"/>
+          </a:effectRef>
+          <a:fontRef idx="minor">
+            <a:schemeClr val="lt1"/>
+          </a:fontRef>
+        </p:style>
+        <p:txBody>
+          <a:bodyPr rtlCol="0" anchor="ctr"/>
+          <a:lstStyle/>
+          <a:p>
+            <a:pPr algn="ctr"/>
+            <a:endParaRPr lang="en-US"/>
+          </a:p>
+        </p:txBody>
+      </p:sp>
+      <p:graphicFrame>
+        <p:nvGraphicFramePr>
+          <p:cNvPr id="126" name="Object 125"/>
+          <p:cNvGraphicFramePr>
+            <a:graphicFrameLocks noChangeAspect="1"/>
+          </p:cNvGraphicFramePr>
+          <p:nvPr>
+            <p:extLst>
+              <p:ext uri="{D42A27DB-BD31-4B8C-83A1-F6EECF244321}">
+                <p14:modId xmlns:p14="http://schemas.microsoft.com/office/powerpoint/2010/main" val="350909360"/>
+              </p:ext>
+            </p:extLst>
+          </p:nvPr>
+        </p:nvGraphicFramePr>
+        <p:xfrm>
+          <a:off x="895351" y="-64079"/>
+          <a:ext cx="1082675" cy="468312"/>
+        </p:xfrm>
+        <a:graphic>
+          <a:graphicData uri="http://schemas.openxmlformats.org/presentationml/2006/ole">
+            <mc:AlternateContent xmlns:mc="http://schemas.openxmlformats.org/markup-compatibility/2006">
+              <mc:Choice xmlns:v="urn:schemas-microsoft-com:vml" Requires="v">
+                <p:oleObj spid="_x0000_s1089" name="Document" r:id="rId22" imgW="5943600" imgH="2552700" progId="Word.Document.12">
+                  <p:embed/>
+                </p:oleObj>
+              </mc:Choice>
+              <mc:Fallback>
+                <p:oleObj name="Document" r:id="rId22" imgW="5943600" imgH="2552700" progId="Word.Document.12">
+                  <p:embed/>
+                  <p:pic>
+                    <p:nvPicPr>
+                      <p:cNvPr id="0" name=""/>
+                      <p:cNvPicPr/>
+                      <p:nvPr/>
+                    </p:nvPicPr>
+                    <p:blipFill>
+                      <a:blip r:embed="rId23"/>
+                      <a:stretch>
+                        <a:fillRect/>
+                      </a:stretch>
+                    </p:blipFill>
+                    <p:spPr>
+                      <a:xfrm>
+                        <a:off x="895351" y="-64079"/>
+                        <a:ext cx="1082675" cy="468312"/>
                       </a:xfrm>
                       <a:prstGeom prst="rect">
                         <a:avLst/>

</xml_diff>